<commit_message>
modified userflow to the state of art design
</commit_message>
<xml_diff>
--- a/web app design user flow/userflow.pptx
+++ b/web app design user flow/userflow.pptx
@@ -4276,8 +4276,8 @@
         </p:nvSpPr>
         <p:spPr>
           <a:xfrm>
-            <a:off x="396453" y="1614195"/>
-            <a:ext cx="3886298" cy="2920482"/>
+            <a:off x="166609" y="422289"/>
+            <a:ext cx="11589962" cy="6164247"/>
           </a:xfrm>
           <a:prstGeom prst="rect">
             <a:avLst/>
@@ -5148,6 +5148,52 @@
           </a:p>
         </p:txBody>
       </p:sp>
+      <p:sp>
+        <p:nvSpPr>
+          <p:cNvPr id="11" name="Rectangle 10">
+            <a:extLst>
+              <a:ext uri="{FF2B5EF4-FFF2-40B4-BE49-F238E27FC236}">
+                <a16:creationId xmlns:a16="http://schemas.microsoft.com/office/drawing/2014/main" id="{28B3A30B-F534-481D-9D3A-867A3AADC675}"/>
+              </a:ext>
+            </a:extLst>
+          </p:cNvPr>
+          <p:cNvSpPr/>
+          <p:nvPr/>
+        </p:nvSpPr>
+        <p:spPr>
+          <a:xfrm>
+            <a:off x="171236" y="600650"/>
+            <a:ext cx="11589962" cy="6164247"/>
+          </a:xfrm>
+          <a:prstGeom prst="rect">
+            <a:avLst/>
+          </a:prstGeom>
+        </p:spPr>
+        <p:style>
+          <a:lnRef idx="2">
+            <a:schemeClr val="accent3">
+              <a:shade val="50000"/>
+            </a:schemeClr>
+          </a:lnRef>
+          <a:fillRef idx="1">
+            <a:schemeClr val="accent3"/>
+          </a:fillRef>
+          <a:effectRef idx="0">
+            <a:schemeClr val="accent3"/>
+          </a:effectRef>
+          <a:fontRef idx="minor">
+            <a:schemeClr val="lt1"/>
+          </a:fontRef>
+        </p:style>
+        <p:txBody>
+          <a:bodyPr rtlCol="0" anchor="ctr"/>
+          <a:lstStyle/>
+          <a:p>
+            <a:pPr algn="ctr"/>
+            <a:endParaRPr lang="en-US" dirty="0"/>
+          </a:p>
+        </p:txBody>
+      </p:sp>
     </p:spTree>
     <p:extLst>
       <p:ext uri="{BB962C8B-B14F-4D97-AF65-F5344CB8AC3E}">
@@ -7339,16 +7385,20 @@
               <a:t>hardware_checkin_page</a:t>
             </a:r>
             <a:r>
+              <a:rPr lang="en-US" b="1" strike="sngStrike" dirty="0"/>
+              <a:t>, </a:t>
+            </a:r>
+            <a:r>
+              <a:rPr lang="en-US" b="1" strike="sngStrike" dirty="0" err="1"/>
+              <a:t>hardware_checkin_success_page</a:t>
+            </a:r>
+            <a:r>
+              <a:rPr lang="en-US" b="1" strike="sngStrike" dirty="0"/>
+              <a:t> </a:t>
+            </a:r>
+            <a:r>
               <a:rPr lang="en-US" b="1" dirty="0"/>
               <a:t>, </a:t>
-            </a:r>
-            <a:r>
-              <a:rPr lang="en-US" b="1" dirty="0" err="1"/>
-              <a:t>hardware_checkin_success_page</a:t>
-            </a:r>
-            <a:r>
-              <a:rPr lang="en-US" b="1" dirty="0"/>
-              <a:t> , </a:t>
             </a:r>
           </a:p>
           <a:p>
@@ -7360,16 +7410,20 @@
               <a:t>hardware_checkout_page</a:t>
             </a:r>
             <a:r>
-              <a:rPr lang="en-US" b="1" dirty="0"/>
+              <a:rPr lang="en-US" b="1" strike="sngStrike" dirty="0"/>
               <a:t>, </a:t>
             </a:r>
             <a:r>
-              <a:rPr lang="en-US" b="1" dirty="0" err="1"/>
+              <a:rPr lang="en-US" b="1" strike="sngStrike" dirty="0" err="1"/>
               <a:t>hardware_checkout_success_page</a:t>
             </a:r>
             <a:r>
+              <a:rPr lang="en-US" strike="sngStrike" dirty="0"/>
+              <a:t> </a:t>
+            </a:r>
+            <a:r>
               <a:rPr lang="en-US" dirty="0"/>
-              <a:t> ,</a:t>
+              <a:t>,</a:t>
             </a:r>
           </a:p>
           <a:p>
@@ -7721,9 +7775,10 @@
               <a:buNone/>
             </a:pPr>
             <a:r>
-              <a:rPr lang="en-US" dirty="0"/>
-              <a:t>Not implemented yet</a:t>
-            </a:r>
+              <a:rPr lang="en-US"/>
+              <a:t>done</a:t>
+            </a:r>
+            <a:endParaRPr lang="en-US" dirty="0"/>
           </a:p>
         </p:txBody>
       </p:sp>
@@ -7893,12 +7948,25 @@
               <a:buNone/>
             </a:pPr>
             <a:r>
+              <a:rPr lang="en-US" strike="sngStrike" dirty="0" err="1"/>
+              <a:t>Demo_page</a:t>
+            </a:r>
+            <a:r>
+              <a:rPr lang="en-US" strike="sngStrike" dirty="0"/>
+              <a:t>:</a:t>
+            </a:r>
+          </a:p>
+          <a:p>
+            <a:pPr marL="0" indent="0">
+              <a:buNone/>
+            </a:pPr>
+            <a:r>
               <a:rPr lang="en-US" dirty="0" err="1"/>
-              <a:t>Demo_page</a:t>
+              <a:t>Userguide</a:t>
             </a:r>
             <a:r>
               <a:rPr lang="en-US" dirty="0"/>
-              <a:t>:</a:t>
+              <a:t> page:</a:t>
             </a:r>
           </a:p>
           <a:p>
@@ -7912,15 +7980,15 @@
               <a:buNone/>
             </a:pPr>
             <a:r>
-              <a:rPr lang="en-US" dirty="0"/>
+              <a:rPr lang="en-US" strike="sngStrike" dirty="0"/>
               <a:t>We can make a video of our web application demo, uploaded it to </a:t>
             </a:r>
             <a:r>
-              <a:rPr lang="en-US" dirty="0" err="1"/>
+              <a:rPr lang="en-US" strike="sngStrike" dirty="0" err="1"/>
               <a:t>youtube</a:t>
             </a:r>
             <a:r>
-              <a:rPr lang="en-US" dirty="0"/>
+              <a:rPr lang="en-US" strike="sngStrike" dirty="0"/>
               <a:t>, and use API to display it on this page.</a:t>
             </a:r>
           </a:p>
@@ -8187,6 +8255,52 @@
           </a:p>
         </p:txBody>
       </p:sp>
+      <p:sp>
+        <p:nvSpPr>
+          <p:cNvPr id="10" name="Rectangle 9">
+            <a:extLst>
+              <a:ext uri="{FF2B5EF4-FFF2-40B4-BE49-F238E27FC236}">
+                <a16:creationId xmlns:a16="http://schemas.microsoft.com/office/drawing/2014/main" id="{2EAB48FA-FAA4-4838-AA3B-2897464A2B7A}"/>
+              </a:ext>
+            </a:extLst>
+          </p:cNvPr>
+          <p:cNvSpPr/>
+          <p:nvPr/>
+        </p:nvSpPr>
+        <p:spPr>
+          <a:xfrm>
+            <a:off x="3349690" y="1617967"/>
+            <a:ext cx="2634342" cy="2001981"/>
+          </a:xfrm>
+          <a:prstGeom prst="rect">
+            <a:avLst/>
+          </a:prstGeom>
+        </p:spPr>
+        <p:style>
+          <a:lnRef idx="2">
+            <a:schemeClr val="accent3">
+              <a:shade val="50000"/>
+            </a:schemeClr>
+          </a:lnRef>
+          <a:fillRef idx="1">
+            <a:schemeClr val="accent3"/>
+          </a:fillRef>
+          <a:effectRef idx="0">
+            <a:schemeClr val="accent3"/>
+          </a:effectRef>
+          <a:fontRef idx="minor">
+            <a:schemeClr val="lt1"/>
+          </a:fontRef>
+        </p:style>
+        <p:txBody>
+          <a:bodyPr rtlCol="0" anchor="ctr"/>
+          <a:lstStyle/>
+          <a:p>
+            <a:pPr algn="ctr"/>
+            <a:endParaRPr lang="en-US" dirty="0"/>
+          </a:p>
+        </p:txBody>
+      </p:sp>
     </p:spTree>
     <p:extLst>
       <p:ext uri="{BB962C8B-B14F-4D97-AF65-F5344CB8AC3E}">
@@ -10424,6 +10538,52 @@
               <a:rPr lang="en-US" dirty="0" err="1"/>
               <a:t>download_dataset_page</a:t>
             </a:r>
+            <a:endParaRPr lang="en-US" dirty="0"/>
+          </a:p>
+        </p:txBody>
+      </p:sp>
+      <p:sp>
+        <p:nvSpPr>
+          <p:cNvPr id="8" name="Rectangle 7">
+            <a:extLst>
+              <a:ext uri="{FF2B5EF4-FFF2-40B4-BE49-F238E27FC236}">
+                <a16:creationId xmlns:a16="http://schemas.microsoft.com/office/drawing/2014/main" id="{309A319D-89B9-4818-9F67-689C5A507349}"/>
+              </a:ext>
+            </a:extLst>
+          </p:cNvPr>
+          <p:cNvSpPr/>
+          <p:nvPr/>
+        </p:nvSpPr>
+        <p:spPr>
+          <a:xfrm>
+            <a:off x="2868725" y="111967"/>
+            <a:ext cx="5622132" cy="6578081"/>
+          </a:xfrm>
+          <a:prstGeom prst="rect">
+            <a:avLst/>
+          </a:prstGeom>
+        </p:spPr>
+        <p:style>
+          <a:lnRef idx="2">
+            <a:schemeClr val="accent3">
+              <a:shade val="50000"/>
+            </a:schemeClr>
+          </a:lnRef>
+          <a:fillRef idx="1">
+            <a:schemeClr val="accent3"/>
+          </a:fillRef>
+          <a:effectRef idx="0">
+            <a:schemeClr val="accent3"/>
+          </a:effectRef>
+          <a:fontRef idx="minor">
+            <a:schemeClr val="lt1"/>
+          </a:fontRef>
+        </p:style>
+        <p:txBody>
+          <a:bodyPr rtlCol="0" anchor="ctr"/>
+          <a:lstStyle/>
+          <a:p>
+            <a:pPr algn="ctr"/>
             <a:endParaRPr lang="en-US" dirty="0"/>
           </a:p>
         </p:txBody>

</xml_diff>